<commit_message>
Remove specific host configuration from Flask app and delete unused report document
</commit_message>
<xml_diff>
--- a/Guess-Game-Online[1]00.pptx
+++ b/Guess-Game-Online[1]00.pptx
@@ -3290,7 +3290,7 @@
         <p:spPr>
           <a:xfrm>
             <a:off x="514350" y="1771650"/>
-            <a:ext cx="8172450" cy="3477875"/>
+            <a:ext cx="9099984" cy="5693866"/>
           </a:xfrm>
           <a:prstGeom prst="rect">
             <a:avLst/>
@@ -3308,14 +3308,14 @@
               <a:buChar char="•"/>
             </a:pPr>
             <a:r>
-              <a:rPr lang="en-US" sz="2000" b="1" dirty="0">
+              <a:rPr lang="en-US" sz="2800" b="1" dirty="0">
                 <a:latin typeface="Alexandria Semi Bold" panose="020B0604020202020204" charset="-78"/>
                 <a:cs typeface="Alexandria Semi Bold" panose="020B0604020202020204" charset="-78"/>
               </a:rPr>
               <a:t>Overview</a:t>
             </a:r>
             <a:r>
-              <a:rPr lang="en-US" sz="2000" dirty="0">
+              <a:rPr lang="en-US" sz="2800" dirty="0">
                 <a:latin typeface="Alexandria Semi Bold" panose="020B0604020202020204" charset="-78"/>
                 <a:cs typeface="Alexandria Semi Bold" panose="020B0604020202020204" charset="-78"/>
               </a:rPr>
@@ -3328,14 +3328,14 @@
               <a:buChar char="•"/>
             </a:pPr>
             <a:r>
-              <a:rPr lang="en-US" sz="2000" b="1" dirty="0">
+              <a:rPr lang="en-US" sz="2800" b="1" dirty="0">
                 <a:latin typeface="Alexandria Semi Bold" panose="020B0604020202020204" charset="-78"/>
                 <a:cs typeface="Alexandria Semi Bold" panose="020B0604020202020204" charset="-78"/>
               </a:rPr>
               <a:t>Key Features</a:t>
             </a:r>
             <a:r>
-              <a:rPr lang="en-US" sz="2000" dirty="0">
+              <a:rPr lang="en-US" sz="2800" dirty="0">
                 <a:latin typeface="Alexandria Semi Bold" panose="020B0604020202020204" charset="-78"/>
                 <a:cs typeface="Alexandria Semi Bold" panose="020B0604020202020204" charset="-78"/>
               </a:rPr>
@@ -3348,7 +3348,7 @@
               <a:buChar char="•"/>
             </a:pPr>
             <a:r>
-              <a:rPr lang="en-US" sz="2000" dirty="0">
+              <a:rPr lang="en-US" sz="2800" dirty="0">
                 <a:latin typeface="Alexandria Semi Bold" panose="020B0604020202020204" charset="-78"/>
                 <a:cs typeface="Alexandria Semi Bold" panose="020B0604020202020204" charset="-78"/>
               </a:rPr>
@@ -3361,7 +3361,7 @@
               <a:buChar char="•"/>
             </a:pPr>
             <a:r>
-              <a:rPr lang="en-US" sz="2000" dirty="0">
+              <a:rPr lang="en-US" sz="2800" dirty="0">
                 <a:latin typeface="Alexandria Semi Bold" panose="020B0604020202020204" charset="-78"/>
                 <a:cs typeface="Alexandria Semi Bold" panose="020B0604020202020204" charset="-78"/>
               </a:rPr>
@@ -3374,7 +3374,7 @@
               <a:buChar char="•"/>
             </a:pPr>
             <a:r>
-              <a:rPr lang="en-US" sz="2000" dirty="0">
+              <a:rPr lang="en-US" sz="2800" dirty="0">
                 <a:latin typeface="Alexandria Semi Bold" panose="020B0604020202020204" charset="-78"/>
                 <a:cs typeface="Alexandria Semi Bold" panose="020B0604020202020204" charset="-78"/>
               </a:rPr>
@@ -3387,14 +3387,14 @@
               <a:buChar char="•"/>
             </a:pPr>
             <a:r>
-              <a:rPr lang="en-US" sz="2000" b="1" dirty="0">
+              <a:rPr lang="en-US" sz="2800" b="1" dirty="0">
                 <a:latin typeface="Alexandria Semi Bold" panose="020B0604020202020204" charset="-78"/>
                 <a:cs typeface="Alexandria Semi Bold" panose="020B0604020202020204" charset="-78"/>
               </a:rPr>
               <a:t>Technology Stack</a:t>
             </a:r>
             <a:r>
-              <a:rPr lang="en-US" sz="2000" dirty="0">
+              <a:rPr lang="en-US" sz="2800" dirty="0">
                 <a:latin typeface="Alexandria Semi Bold" panose="020B0604020202020204" charset="-78"/>
                 <a:cs typeface="Alexandria Semi Bold" panose="020B0604020202020204" charset="-78"/>
               </a:rPr>
@@ -3407,14 +3407,14 @@
               <a:buChar char="•"/>
             </a:pPr>
             <a:r>
-              <a:rPr lang="en-US" sz="2000" b="1" dirty="0">
+              <a:rPr lang="en-US" sz="2800" b="1" dirty="0">
                 <a:latin typeface="Alexandria Semi Bold" panose="020B0604020202020204" charset="-78"/>
                 <a:cs typeface="Alexandria Semi Bold" panose="020B0604020202020204" charset="-78"/>
               </a:rPr>
               <a:t>Frontend</a:t>
             </a:r>
             <a:r>
-              <a:rPr lang="en-US" sz="2000" dirty="0">
+              <a:rPr lang="en-US" sz="2800" dirty="0">
                 <a:latin typeface="Alexandria Semi Bold" panose="020B0604020202020204" charset="-78"/>
                 <a:cs typeface="Alexandria Semi Bold" panose="020B0604020202020204" charset="-78"/>
               </a:rPr>
@@ -3427,14 +3427,14 @@
               <a:buChar char="•"/>
             </a:pPr>
             <a:r>
-              <a:rPr lang="en-US" sz="2000" b="1" dirty="0">
+              <a:rPr lang="en-US" sz="2800" b="1" dirty="0">
                 <a:latin typeface="Alexandria Semi Bold" panose="020B0604020202020204" charset="-78"/>
                 <a:cs typeface="Alexandria Semi Bold" panose="020B0604020202020204" charset="-78"/>
               </a:rPr>
               <a:t>Backend</a:t>
             </a:r>
             <a:r>
-              <a:rPr lang="en-US" sz="2000" dirty="0">
+              <a:rPr lang="en-US" sz="2800" dirty="0">
                 <a:latin typeface="Alexandria Semi Bold" panose="020B0604020202020204" charset="-78"/>
                 <a:cs typeface="Alexandria Semi Bold" panose="020B0604020202020204" charset="-78"/>
               </a:rPr>
@@ -3447,14 +3447,14 @@
               <a:buChar char="•"/>
             </a:pPr>
             <a:r>
-              <a:rPr lang="en-US" sz="2000" b="1" dirty="0">
+              <a:rPr lang="en-US" sz="2800" b="1" dirty="0">
                 <a:latin typeface="Alexandria Semi Bold" panose="020B0604020202020204" charset="-78"/>
                 <a:cs typeface="Alexandria Semi Bold" panose="020B0604020202020204" charset="-78"/>
               </a:rPr>
               <a:t>Data Structures</a:t>
             </a:r>
             <a:r>
-              <a:rPr lang="en-US" sz="2000" dirty="0">
+              <a:rPr lang="en-US" sz="2800" dirty="0">
                 <a:latin typeface="Alexandria Semi Bold" panose="020B0604020202020204" charset="-78"/>
                 <a:cs typeface="Alexandria Semi Bold" panose="020B0604020202020204" charset="-78"/>
               </a:rPr>
@@ -3712,7 +3712,7 @@
         <p:spPr>
           <a:xfrm>
             <a:off x="514350" y="2198209"/>
-            <a:ext cx="13144500" cy="4062651"/>
+            <a:ext cx="13685744" cy="4678204"/>
           </a:xfrm>
           <a:prstGeom prst="rect">
             <a:avLst/>
@@ -3726,7 +3726,7 @@
           <a:lstStyle/>
           <a:p>
             <a:r>
-              <a:rPr lang="en-US" sz="2400" dirty="0">
+              <a:rPr lang="en-US" sz="2800" dirty="0">
                 <a:latin typeface="Alexandria Semi Bold" panose="020B0604020202020204" charset="-78"/>
                 <a:cs typeface="Alexandria Semi Bold" panose="020B0604020202020204" charset="-78"/>
               </a:rPr>
@@ -3739,14 +3739,14 @@
               <a:buChar char="•"/>
             </a:pPr>
             <a:r>
-              <a:rPr lang="en-US" sz="2400" b="1" dirty="0">
+              <a:rPr lang="en-US" sz="2800" b="1" dirty="0">
                 <a:latin typeface="Alexandria Semi Bold" panose="020B0604020202020204" charset="-78"/>
                 <a:cs typeface="Alexandria Semi Bold" panose="020B0604020202020204" charset="-78"/>
               </a:rPr>
               <a:t>Challenges</a:t>
             </a:r>
             <a:r>
-              <a:rPr lang="en-US" sz="2400" dirty="0">
+              <a:rPr lang="en-US" sz="2800" dirty="0">
                 <a:latin typeface="Alexandria Semi Bold" panose="020B0604020202020204" charset="-78"/>
                 <a:cs typeface="Alexandria Semi Bold" panose="020B0604020202020204" charset="-78"/>
               </a:rPr>
@@ -3759,7 +3759,7 @@
               <a:buChar char="•"/>
             </a:pPr>
             <a:r>
-              <a:rPr lang="en-US" sz="2400" dirty="0">
+              <a:rPr lang="en-US" sz="2800" dirty="0">
                 <a:latin typeface="Alexandria Semi Bold" panose="020B0604020202020204" charset="-78"/>
                 <a:cs typeface="Alexandria Semi Bold" panose="020B0604020202020204" charset="-78"/>
               </a:rPr>
@@ -3772,7 +3772,7 @@
               <a:buChar char="•"/>
             </a:pPr>
             <a:r>
-              <a:rPr lang="en-US" sz="2400" dirty="0">
+              <a:rPr lang="en-US" sz="2800" dirty="0">
                 <a:latin typeface="Alexandria Semi Bold" panose="020B0604020202020204" charset="-78"/>
                 <a:cs typeface="Alexandria Semi Bold" panose="020B0604020202020204" charset="-78"/>
               </a:rPr>
@@ -3785,7 +3785,7 @@
               <a:buChar char="•"/>
             </a:pPr>
             <a:r>
-              <a:rPr lang="en-US" sz="2400" dirty="0">
+              <a:rPr lang="en-US" sz="2800" dirty="0">
                 <a:latin typeface="Alexandria Semi Bold" panose="020B0604020202020204" charset="-78"/>
                 <a:cs typeface="Alexandria Semi Bold" panose="020B0604020202020204" charset="-78"/>
               </a:rPr>
@@ -3798,14 +3798,14 @@
               <a:buChar char="•"/>
             </a:pPr>
             <a:r>
-              <a:rPr lang="en-US" sz="2400" b="1" dirty="0">
+              <a:rPr lang="en-US" sz="2800" b="1" dirty="0">
                 <a:latin typeface="Alexandria Semi Bold" panose="020B0604020202020204" charset="-78"/>
                 <a:cs typeface="Alexandria Semi Bold" panose="020B0604020202020204" charset="-78"/>
               </a:rPr>
               <a:t>Objective</a:t>
             </a:r>
             <a:r>
-              <a:rPr lang="en-US" sz="2400" dirty="0">
+              <a:rPr lang="en-US" sz="2800" dirty="0">
                 <a:latin typeface="Alexandria Semi Bold" panose="020B0604020202020204" charset="-78"/>
                 <a:cs typeface="Alexandria Semi Bold" panose="020B0604020202020204" charset="-78"/>
               </a:rPr>
@@ -3818,7 +3818,7 @@
               <a:buChar char="•"/>
             </a:pPr>
             <a:r>
-              <a:rPr lang="en-US" sz="2400" dirty="0">
+              <a:rPr lang="en-US" sz="2800" dirty="0">
                 <a:latin typeface="Alexandria Semi Bold" panose="020B0604020202020204" charset="-78"/>
                 <a:cs typeface="Alexandria Semi Bold" panose="020B0604020202020204" charset="-78"/>
               </a:rPr>
@@ -3831,7 +3831,7 @@
               <a:buChar char="•"/>
             </a:pPr>
             <a:r>
-              <a:rPr lang="en-US" sz="2400" dirty="0">
+              <a:rPr lang="en-US" sz="2800" dirty="0">
                 <a:latin typeface="Alexandria Semi Bold" panose="020B0604020202020204" charset="-78"/>
                 <a:cs typeface="Alexandria Semi Bold" panose="020B0604020202020204" charset="-78"/>
               </a:rPr>
@@ -3839,7 +3839,7 @@
             </a:r>
           </a:p>
           <a:p>
-            <a:endParaRPr lang="en-US" dirty="0"/>
+            <a:endParaRPr lang="en-US" sz="2000" dirty="0"/>
           </a:p>
         </p:txBody>
       </p:sp>
@@ -4048,11 +4048,11 @@
           <a:bodyPr wrap="none" lIns="0" tIns="0" rIns="0" bIns="0" rtlCol="0" anchor="t"/>
           <a:lstStyle/>
           <a:p>
-            <a:pPr marL="0" indent="0" algn="l">
+            <a:pPr marL="342900" indent="-342900" algn="l">
               <a:lnSpc>
                 <a:spcPts val="2700"/>
               </a:lnSpc>
-              <a:buNone/>
+              <a:buAutoNum type="arabicPeriod"/>
             </a:pPr>
             <a:r>
               <a:rPr lang="en-US" sz="1700" dirty="0">
@@ -4062,7 +4062,250 @@
                 <a:latin typeface="Sora Light" pitchFamily="34" charset="0"/>
                 <a:cs typeface="Sora Light" pitchFamily="34" charset="-120"/>
               </a:rPr>
-              <a:t>Queue</a:t>
+              <a:t>Creating an array from the word to be guessed.</a:t>
+            </a:r>
+          </a:p>
+          <a:p>
+            <a:pPr algn="l">
+              <a:lnSpc>
+                <a:spcPts val="2700"/>
+              </a:lnSpc>
+            </a:pPr>
+            <a:endParaRPr lang="en-US" sz="1700" dirty="0">
+              <a:solidFill>
+                <a:srgbClr val="3B3535"/>
+              </a:solidFill>
+              <a:latin typeface="Sora Light" pitchFamily="34" charset="0"/>
+              <a:cs typeface="Sora Light" pitchFamily="34" charset="-120"/>
+            </a:endParaRPr>
+          </a:p>
+          <a:p>
+            <a:pPr algn="l">
+              <a:lnSpc>
+                <a:spcPts val="2700"/>
+              </a:lnSpc>
+            </a:pPr>
+            <a:endParaRPr lang="en-US" sz="1700" dirty="0">
+              <a:solidFill>
+                <a:srgbClr val="3B3535"/>
+              </a:solidFill>
+              <a:latin typeface="Sora Light" pitchFamily="34" charset="0"/>
+              <a:cs typeface="Sora Light" pitchFamily="34" charset="-120"/>
+            </a:endParaRPr>
+          </a:p>
+          <a:p>
+            <a:pPr algn="l">
+              <a:lnSpc>
+                <a:spcPts val="2700"/>
+              </a:lnSpc>
+            </a:pPr>
+            <a:r>
+              <a:rPr lang="en-US" sz="1700" dirty="0">
+                <a:solidFill>
+                  <a:srgbClr val="3B3535"/>
+                </a:solidFill>
+                <a:latin typeface="Sora Light" pitchFamily="34" charset="0"/>
+                <a:cs typeface="Sora Light" pitchFamily="34" charset="-120"/>
+              </a:rPr>
+              <a:t>2. Using array for storing all words from the</a:t>
+            </a:r>
+          </a:p>
+          <a:p>
+            <a:pPr algn="l">
+              <a:lnSpc>
+                <a:spcPts val="2700"/>
+              </a:lnSpc>
+            </a:pPr>
+            <a:r>
+              <a:rPr lang="en-US" sz="1700" dirty="0">
+                <a:solidFill>
+                  <a:srgbClr val="3B3535"/>
+                </a:solidFill>
+                <a:latin typeface="Sora Light" pitchFamily="34" charset="0"/>
+                <a:cs typeface="Sora Light" pitchFamily="34" charset="-120"/>
+              </a:rPr>
+              <a:t> database that are retrieved from the database</a:t>
+            </a:r>
+          </a:p>
+          <a:p>
+            <a:pPr algn="l">
+              <a:lnSpc>
+                <a:spcPts val="2700"/>
+              </a:lnSpc>
+            </a:pPr>
+            <a:r>
+              <a:rPr lang="en-US" sz="1700" dirty="0">
+                <a:solidFill>
+                  <a:srgbClr val="3B3535"/>
+                </a:solidFill>
+                <a:latin typeface="Sora Light" pitchFamily="34" charset="0"/>
+                <a:cs typeface="Sora Light" pitchFamily="34" charset="-120"/>
+              </a:rPr>
+              <a:t>.</a:t>
+            </a:r>
+          </a:p>
+          <a:p>
+            <a:pPr algn="l">
+              <a:lnSpc>
+                <a:spcPts val="2700"/>
+              </a:lnSpc>
+            </a:pPr>
+            <a:r>
+              <a:rPr lang="en-US" sz="1700" dirty="0">
+                <a:solidFill>
+                  <a:srgbClr val="3B3535"/>
+                </a:solidFill>
+                <a:latin typeface="Sora Light" pitchFamily="34" charset="0"/>
+                <a:cs typeface="Sora Light" pitchFamily="34" charset="-120"/>
+              </a:rPr>
+              <a:t>3. Using SET for storing wrong letters that avoid </a:t>
+            </a:r>
+          </a:p>
+          <a:p>
+            <a:pPr algn="l">
+              <a:lnSpc>
+                <a:spcPts val="2700"/>
+              </a:lnSpc>
+            </a:pPr>
+            <a:r>
+              <a:rPr lang="en-US" sz="1700" dirty="0">
+                <a:solidFill>
+                  <a:srgbClr val="3B3535"/>
+                </a:solidFill>
+                <a:latin typeface="Sora Light" pitchFamily="34" charset="0"/>
+                <a:cs typeface="Sora Light" pitchFamily="34" charset="-120"/>
+              </a:rPr>
+              <a:t>duplicate wrong letters</a:t>
+            </a:r>
+          </a:p>
+          <a:p>
+            <a:pPr algn="l">
+              <a:lnSpc>
+                <a:spcPts val="2700"/>
+              </a:lnSpc>
+            </a:pPr>
+            <a:endParaRPr lang="en-US" sz="1700" dirty="0">
+              <a:solidFill>
+                <a:srgbClr val="3B3535"/>
+              </a:solidFill>
+              <a:latin typeface="Sora Light" pitchFamily="34" charset="0"/>
+              <a:cs typeface="Sora Light" pitchFamily="34" charset="-120"/>
+            </a:endParaRPr>
+          </a:p>
+          <a:p>
+            <a:pPr algn="l">
+              <a:lnSpc>
+                <a:spcPts val="2700"/>
+              </a:lnSpc>
+            </a:pPr>
+            <a:r>
+              <a:rPr lang="en-US" sz="1700" dirty="0">
+                <a:solidFill>
+                  <a:srgbClr val="3B3535"/>
+                </a:solidFill>
+                <a:latin typeface="Sora Light" pitchFamily="34" charset="0"/>
+                <a:cs typeface="Sora Light" pitchFamily="34" charset="-120"/>
+              </a:rPr>
+              <a:t>.4. An array for storing score information, like count</a:t>
+            </a:r>
+          </a:p>
+          <a:p>
+            <a:pPr algn="l">
+              <a:lnSpc>
+                <a:spcPts val="2700"/>
+              </a:lnSpc>
+            </a:pPr>
+            <a:r>
+              <a:rPr lang="en-US" sz="1700" dirty="0">
+                <a:solidFill>
+                  <a:srgbClr val="3B3535"/>
+                </a:solidFill>
+                <a:latin typeface="Sora Light" pitchFamily="34" charset="0"/>
+                <a:cs typeface="Sora Light" pitchFamily="34" charset="-120"/>
+              </a:rPr>
+              <a:t> the correct guessed word. And calculate the score.</a:t>
+            </a:r>
+          </a:p>
+          <a:p>
+            <a:pPr algn="l">
+              <a:lnSpc>
+                <a:spcPts val="2700"/>
+              </a:lnSpc>
+            </a:pPr>
+            <a:r>
+              <a:rPr lang="en-US" sz="1700" dirty="0">
+                <a:solidFill>
+                  <a:srgbClr val="3B3535"/>
+                </a:solidFill>
+                <a:latin typeface="Sora Light" pitchFamily="34" charset="0"/>
+                <a:cs typeface="Sora Light" pitchFamily="34" charset="-120"/>
+              </a:rPr>
+              <a:t> it will be added to a 2d array table in our database</a:t>
+            </a:r>
+          </a:p>
+          <a:p>
+            <a:pPr algn="l">
+              <a:lnSpc>
+                <a:spcPts val="2700"/>
+              </a:lnSpc>
+            </a:pPr>
+            <a:endParaRPr lang="en-US" sz="1700" dirty="0">
+              <a:solidFill>
+                <a:srgbClr val="3B3535"/>
+              </a:solidFill>
+              <a:latin typeface="Sora Light" pitchFamily="34" charset="0"/>
+              <a:cs typeface="Sora Light" pitchFamily="34" charset="-120"/>
+            </a:endParaRPr>
+          </a:p>
+          <a:p>
+            <a:pPr algn="l">
+              <a:lnSpc>
+                <a:spcPts val="2700"/>
+              </a:lnSpc>
+            </a:pPr>
+            <a:r>
+              <a:rPr lang="en-US" sz="1700" dirty="0">
+                <a:solidFill>
+                  <a:srgbClr val="3B3535"/>
+                </a:solidFill>
+                <a:latin typeface="Sora Light" pitchFamily="34" charset="0"/>
+                <a:cs typeface="Sora Light" pitchFamily="34" charset="-120"/>
+              </a:rPr>
+              <a:t>5. When the letter is entered it uses searching for </a:t>
+            </a:r>
+          </a:p>
+          <a:p>
+            <a:pPr algn="l">
+              <a:lnSpc>
+                <a:spcPts val="2700"/>
+              </a:lnSpc>
+            </a:pPr>
+            <a:r>
+              <a:rPr lang="en-US" sz="1700" dirty="0">
+                <a:solidFill>
+                  <a:srgbClr val="3B3535"/>
+                </a:solidFill>
+                <a:latin typeface="Sora Light" pitchFamily="34" charset="0"/>
+                <a:cs typeface="Sora Light" pitchFamily="34" charset="-120"/>
+              </a:rPr>
+              <a:t>checking if there is that letter in the word.</a:t>
+            </a:r>
+          </a:p>
+          <a:p>
+            <a:pPr algn="l">
+              <a:lnSpc>
+                <a:spcPts val="2700"/>
+              </a:lnSpc>
+            </a:pPr>
+            <a:r>
+              <a:rPr lang="en-US" sz="1700" dirty="0">
+                <a:solidFill>
+                  <a:srgbClr val="3B3535"/>
+                </a:solidFill>
+                <a:latin typeface="Sora Light" pitchFamily="34" charset="0"/>
+                <a:cs typeface="Sora Light" pitchFamily="34" charset="-120"/>
+              </a:rPr>
+              <a:t>.</a:t>
             </a:r>
             <a:endParaRPr lang="en-US" sz="1700" dirty="0"/>
           </a:p>
@@ -4161,77 +4404,6 @@
       </p:sp>
       <p:sp>
         <p:nvSpPr>
-          <p:cNvPr id="11" name="Text 9"/>
-          <p:cNvSpPr/>
-          <p:nvPr/>
-        </p:nvSpPr>
-        <p:spPr>
-          <a:xfrm>
-            <a:off x="2274808" y="3517940"/>
-            <a:ext cx="11597283" cy="346710"/>
-          </a:xfrm>
-          <a:prstGeom prst="rect">
-            <a:avLst/>
-          </a:prstGeom>
-          <a:noFill/>
-          <a:ln/>
-        </p:spPr>
-        <p:txBody>
-          <a:bodyPr wrap="none" lIns="0" tIns="0" rIns="0" bIns="0" rtlCol="0" anchor="t"/>
-          <a:lstStyle/>
-          <a:p>
-            <a:pPr marL="0" indent="0" algn="l">
-              <a:lnSpc>
-                <a:spcPts val="2700"/>
-              </a:lnSpc>
-              <a:buNone/>
-            </a:pPr>
-            <a:r>
-              <a:rPr lang="en-US" sz="1700" dirty="0" err="1">
-                <a:solidFill>
-                  <a:srgbClr val="3B3535"/>
-                </a:solidFill>
-                <a:latin typeface="Sora Light" pitchFamily="34" charset="0"/>
-                <a:cs typeface="Sora Light" pitchFamily="34" charset="-120"/>
-              </a:rPr>
-              <a:t>GuessedWord</a:t>
-            </a:r>
-            <a:r>
-              <a:rPr lang="en-US" sz="1700" dirty="0">
-                <a:solidFill>
-                  <a:srgbClr val="3B3535"/>
-                </a:solidFill>
-                <a:latin typeface="Sora Light" pitchFamily="34" charset="0"/>
-                <a:cs typeface="Sora Light" pitchFamily="34" charset="-120"/>
-              </a:rPr>
-              <a:t> Array &amp; </a:t>
-            </a:r>
-            <a:r>
-              <a:rPr lang="en-US" sz="1700" dirty="0" err="1">
-                <a:solidFill>
-                  <a:srgbClr val="3B3535"/>
-                </a:solidFill>
-                <a:latin typeface="Sora Light" pitchFamily="34" charset="0"/>
-                <a:cs typeface="Sora Light" pitchFamily="34" charset="-120"/>
-              </a:rPr>
-              <a:t>GuessedLetters</a:t>
-            </a:r>
-            <a:r>
-              <a:rPr lang="en-US" sz="1700" dirty="0">
-                <a:solidFill>
-                  <a:srgbClr val="3B3535"/>
-                </a:solidFill>
-                <a:latin typeface="Sora Light" pitchFamily="34" charset="0"/>
-                <a:cs typeface="Sora Light" pitchFamily="34" charset="-120"/>
-              </a:rPr>
-              <a:t> Set</a:t>
-            </a:r>
-            <a:endParaRPr lang="en-US" sz="1700" dirty="0"/>
-          </a:p>
-        </p:txBody>
-      </p:sp>
-      <p:sp>
-        <p:nvSpPr>
           <p:cNvPr id="12" name="Shape 10"/>
           <p:cNvSpPr/>
           <p:nvPr/>
@@ -4323,59 +4495,6 @@
       </p:sp>
       <p:sp>
         <p:nvSpPr>
-          <p:cNvPr id="15" name="Text 13"/>
-          <p:cNvSpPr/>
-          <p:nvPr/>
-        </p:nvSpPr>
-        <p:spPr>
-          <a:xfrm>
-            <a:off x="2274808" y="4514374"/>
-            <a:ext cx="11597283" cy="346710"/>
-          </a:xfrm>
-          <a:prstGeom prst="rect">
-            <a:avLst/>
-          </a:prstGeom>
-          <a:noFill/>
-          <a:ln/>
-        </p:spPr>
-        <p:txBody>
-          <a:bodyPr wrap="none" lIns="0" tIns="0" rIns="0" bIns="0" rtlCol="0" anchor="t"/>
-          <a:lstStyle/>
-          <a:p>
-            <a:pPr marL="0" indent="0" algn="l">
-              <a:lnSpc>
-                <a:spcPts val="2700"/>
-              </a:lnSpc>
-              <a:buNone/>
-            </a:pPr>
-            <a:r>
-              <a:rPr lang="en-US" sz="1700" dirty="0" err="1">
-                <a:solidFill>
-                  <a:srgbClr val="3B3535"/>
-                </a:solidFill>
-                <a:latin typeface="Sora Light" pitchFamily="34" charset="0"/>
-                <a:ea typeface="Sora Light" pitchFamily="34" charset="-122"/>
-                <a:cs typeface="Sora Light" pitchFamily="34" charset="-120"/>
-              </a:rPr>
-              <a:t>WrongLetters</a:t>
-            </a:r>
-            <a:r>
-              <a:rPr lang="en-US" sz="1700" dirty="0">
-                <a:solidFill>
-                  <a:srgbClr val="3B3535"/>
-                </a:solidFill>
-                <a:latin typeface="Sora Light" pitchFamily="34" charset="0"/>
-                <a:ea typeface="Sora Light" pitchFamily="34" charset="-122"/>
-                <a:cs typeface="Sora Light" pitchFamily="34" charset="-120"/>
-              </a:rPr>
-              <a:t> Array</a:t>
-            </a:r>
-            <a:endParaRPr lang="en-US" sz="1700" dirty="0"/>
-          </a:p>
-        </p:txBody>
-      </p:sp>
-      <p:sp>
-        <p:nvSpPr>
           <p:cNvPr id="16" name="Shape 14"/>
           <p:cNvSpPr/>
           <p:nvPr/>
@@ -4467,74 +4586,13 @@
       </p:sp>
       <p:sp>
         <p:nvSpPr>
-          <p:cNvPr id="19" name="Text 17"/>
-          <p:cNvSpPr/>
-          <p:nvPr/>
-        </p:nvSpPr>
-        <p:spPr>
-          <a:xfrm>
-            <a:off x="2274808" y="5510808"/>
-            <a:ext cx="11597283" cy="346710"/>
-          </a:xfrm>
-          <a:prstGeom prst="rect">
-            <a:avLst/>
-          </a:prstGeom>
-          <a:noFill/>
-          <a:ln/>
-        </p:spPr>
-        <p:txBody>
-          <a:bodyPr wrap="none" lIns="0" tIns="0" rIns="0" bIns="0" rtlCol="0" anchor="t"/>
-          <a:lstStyle/>
-          <a:p>
-            <a:pPr marL="0" indent="0" algn="l">
-              <a:lnSpc>
-                <a:spcPts val="2700"/>
-              </a:lnSpc>
-              <a:buNone/>
-            </a:pPr>
-            <a:r>
-              <a:rPr lang="en-US" sz="1700" dirty="0" err="1">
-                <a:solidFill>
-                  <a:srgbClr val="3B3535"/>
-                </a:solidFill>
-                <a:latin typeface="Sora Light" pitchFamily="34" charset="0"/>
-                <a:cs typeface="Sora Light" pitchFamily="34" charset="-120"/>
-              </a:rPr>
-              <a:t>GuessedWord</a:t>
-            </a:r>
-            <a:r>
-              <a:rPr lang="en-US" sz="1700" dirty="0">
-                <a:solidFill>
-                  <a:srgbClr val="3B3535"/>
-                </a:solidFill>
-                <a:latin typeface="Sora Light" pitchFamily="34" charset="0"/>
-                <a:cs typeface="Sora Light" pitchFamily="34" charset="-120"/>
-              </a:rPr>
-              <a:t> Array &amp; </a:t>
-            </a:r>
-            <a:r>
-              <a:rPr lang="en-US" sz="1700" dirty="0" err="1">
-                <a:solidFill>
-                  <a:srgbClr val="3B3535"/>
-                </a:solidFill>
-                <a:latin typeface="Sora Light" pitchFamily="34" charset="0"/>
-                <a:cs typeface="Sora Light" pitchFamily="34" charset="-120"/>
-              </a:rPr>
-              <a:t>TotalScore</a:t>
-            </a:r>
-            <a:endParaRPr lang="en-US" sz="1700" dirty="0"/>
-          </a:p>
-        </p:txBody>
-      </p:sp>
-      <p:sp>
-        <p:nvSpPr>
           <p:cNvPr id="20" name="Shape 18"/>
           <p:cNvSpPr/>
           <p:nvPr/>
         </p:nvSpPr>
         <p:spPr>
           <a:xfrm>
-            <a:off x="1296472" y="6762869"/>
+            <a:off x="1326952" y="7075818"/>
             <a:ext cx="758309" cy="30480"/>
           </a:xfrm>
           <a:prstGeom prst="roundRect">
@@ -4556,7 +4614,7 @@
         </p:nvSpPr>
         <p:spPr>
           <a:xfrm>
-            <a:off x="839510" y="6534388"/>
+            <a:off x="839510" y="6837581"/>
             <a:ext cx="487442" cy="487442"/>
           </a:xfrm>
           <a:prstGeom prst="roundRect">
@@ -4583,7 +4641,7 @@
         </p:nvSpPr>
         <p:spPr>
           <a:xfrm>
-            <a:off x="976670" y="6607016"/>
+            <a:off x="961430" y="6950904"/>
             <a:ext cx="213122" cy="342067"/>
           </a:xfrm>
           <a:prstGeom prst="rect">
@@ -4614,47 +4672,6 @@
               <a:t>5</a:t>
             </a:r>
             <a:endParaRPr lang="en-US" sz="2650" dirty="0"/>
-          </a:p>
-        </p:txBody>
-      </p:sp>
-      <p:sp>
-        <p:nvSpPr>
-          <p:cNvPr id="23" name="Text 21"/>
-          <p:cNvSpPr/>
-          <p:nvPr/>
-        </p:nvSpPr>
-        <p:spPr>
-          <a:xfrm>
-            <a:off x="2274808" y="6507242"/>
-            <a:ext cx="11597283" cy="346710"/>
-          </a:xfrm>
-          <a:prstGeom prst="rect">
-            <a:avLst/>
-          </a:prstGeom>
-          <a:noFill/>
-          <a:ln/>
-        </p:spPr>
-        <p:txBody>
-          <a:bodyPr wrap="none" lIns="0" tIns="0" rIns="0" bIns="0" rtlCol="0" anchor="t"/>
-          <a:lstStyle/>
-          <a:p>
-            <a:pPr marL="0" indent="0" algn="l">
-              <a:lnSpc>
-                <a:spcPts val="2700"/>
-              </a:lnSpc>
-              <a:buNone/>
-            </a:pPr>
-            <a:r>
-              <a:rPr lang="en-US" sz="1700" dirty="0">
-                <a:solidFill>
-                  <a:srgbClr val="3B3535"/>
-                </a:solidFill>
-                <a:latin typeface="Sora Light" pitchFamily="34" charset="0"/>
-                <a:cs typeface="Sora Light" pitchFamily="34" charset="-120"/>
-              </a:rPr>
-              <a:t>Session &amp; MySQL Database</a:t>
-            </a:r>
-            <a:endParaRPr lang="en-US" sz="1700" dirty="0"/>
           </a:p>
         </p:txBody>
       </p:sp>
@@ -4734,7 +4751,7 @@
         </p:blipFill>
         <p:spPr>
           <a:xfrm>
-            <a:off x="7650675" y="2453300"/>
+            <a:off x="7702706" y="2632329"/>
             <a:ext cx="5911734" cy="4815568"/>
           </a:xfrm>
           <a:prstGeom prst="rect">

</xml_diff>